<commit_message>
Created Nested Templates to enable configurationof CTrail and Config
</commit_message>
<xml_diff>
--- a/assets/CIS Benchmark1.1 Architecture.pptx
+++ b/assets/CIS Benchmark1.1 Architecture.pptx
@@ -247,6 +247,9 @@
         </p15:guide>
       </p15:sldGuideLst>
     </p:ext>
+    <p:ext uri="{2D200454-40CA-4A62-9FC3-DE9A4176ACB9}">
+      <p15:notesGuideLst xmlns:p15="http://schemas.microsoft.com/office/powerpoint/2012/main"/>
+    </p:ext>
   </p:extLst>
 </p:presentation>
 </file>
@@ -345,7 +348,7 @@
             <a:fld id="{0B25AC41-3BEC-9247-8322-91B80C013F2D}" type="datetimeFigureOut">
               <a:rPr lang="en-US" smtClean="0"/>
               <a:pPr/>
-              <a:t>9/25/17</a:t>
+              <a:t>9/27/17</a:t>
             </a:fld>
             <a:endParaRPr lang="en-US" dirty="0"/>
           </a:p>
@@ -616,6 +619,91 @@
     </a:lvl9pPr>
   </p:notesStyle>
 </p:notesMaster>
+</file>
+
+<file path=ppt/notesSlides/notesSlide1.xml><?xml version="1.0" encoding="utf-8"?>
+<p:notes xmlns:a="http://schemas.openxmlformats.org/drawingml/2006/main" xmlns:r="http://schemas.openxmlformats.org/officeDocument/2006/relationships" xmlns:p="http://schemas.openxmlformats.org/presentationml/2006/main">
+  <p:cSld>
+    <p:spTree>
+      <p:nvGrpSpPr>
+        <p:cNvPr id="1" name=""/>
+        <p:cNvGrpSpPr/>
+        <p:nvPr/>
+      </p:nvGrpSpPr>
+      <p:grpSpPr>
+        <a:xfrm>
+          <a:off x="0" y="0"/>
+          <a:ext cx="0" cy="0"/>
+          <a:chOff x="0" y="0"/>
+          <a:chExt cx="0" cy="0"/>
+        </a:xfrm>
+      </p:grpSpPr>
+      <p:sp>
+        <p:nvSpPr>
+          <p:cNvPr id="2" name="Slide Image Placeholder 1"/>
+          <p:cNvSpPr>
+            <a:spLocks noGrp="1" noRot="1" noChangeAspect="1"/>
+          </p:cNvSpPr>
+          <p:nvPr>
+            <p:ph type="sldImg"/>
+          </p:nvPr>
+        </p:nvSpPr>
+        <p:spPr/>
+      </p:sp>
+      <p:sp>
+        <p:nvSpPr>
+          <p:cNvPr id="3" name="Notes Placeholder 2"/>
+          <p:cNvSpPr>
+            <a:spLocks noGrp="1"/>
+          </p:cNvSpPr>
+          <p:nvPr>
+            <p:ph type="body" idx="1"/>
+          </p:nvPr>
+        </p:nvSpPr>
+        <p:spPr/>
+        <p:txBody>
+          <a:bodyPr/>
+          <a:lstStyle/>
+          <a:p>
+            <a:endParaRPr lang="en-US" dirty="0"/>
+          </a:p>
+        </p:txBody>
+      </p:sp>
+      <p:sp>
+        <p:nvSpPr>
+          <p:cNvPr id="4" name="Slide Number Placeholder 3"/>
+          <p:cNvSpPr>
+            <a:spLocks noGrp="1"/>
+          </p:cNvSpPr>
+          <p:nvPr>
+            <p:ph type="sldNum" sz="quarter" idx="10"/>
+          </p:nvPr>
+        </p:nvSpPr>
+        <p:spPr/>
+        <p:txBody>
+          <a:bodyPr/>
+          <a:lstStyle/>
+          <a:p>
+            <a:fld id="{69C3F2ED-74C5-7D4F-8560-0CC253E9A436}" type="slidenum">
+              <a:rPr lang="en-US" smtClean="0"/>
+              <a:pPr/>
+              <a:t>1</a:t>
+            </a:fld>
+            <a:endParaRPr lang="en-US" dirty="0"/>
+          </a:p>
+        </p:txBody>
+      </p:sp>
+    </p:spTree>
+    <p:extLst>
+      <p:ext uri="{BB962C8B-B14F-4D97-AF65-F5344CB8AC3E}">
+        <p14:creationId xmlns:p14="http://schemas.microsoft.com/office/powerpoint/2010/main" val="898753675"/>
+      </p:ext>
+    </p:extLst>
+  </p:cSld>
+  <p:clrMapOvr>
+    <a:masterClrMapping/>
+  </p:clrMapOvr>
+</p:notes>
 </file>
 
 <file path=ppt/slideLayouts/slideLayout1.xml><?xml version="1.0" encoding="utf-8"?>
@@ -4402,36 +4490,6 @@
           <p:nvPr/>
         </p:nvPicPr>
         <p:blipFill>
-          <a:blip r:embed="rId2">
-            <a:extLst>
-              <a:ext uri="{28A0092B-C50C-407E-A947-70E740481C1C}">
-                <a14:useLocalDpi xmlns:a14="http://schemas.microsoft.com/office/drawing/2010/main" val="0"/>
-              </a:ext>
-            </a:extLst>
-          </a:blip>
-          <a:stretch>
-            <a:fillRect/>
-          </a:stretch>
-        </p:blipFill>
-        <p:spPr>
-          <a:xfrm>
-            <a:off x="5409597" y="154563"/>
-            <a:ext cx="468336" cy="485681"/>
-          </a:xfrm>
-          <a:prstGeom prst="rect">
-            <a:avLst/>
-          </a:prstGeom>
-        </p:spPr>
-      </p:pic>
-      <p:pic>
-        <p:nvPicPr>
-          <p:cNvPr id="3" name="Picture 2"/>
-          <p:cNvPicPr>
-            <a:picLocks noChangeAspect="1"/>
-          </p:cNvPicPr>
-          <p:nvPr/>
-        </p:nvPicPr>
-        <p:blipFill>
           <a:blip r:embed="rId3">
             <a:extLst>
               <a:ext uri="{28A0092B-C50C-407E-A947-70E740481C1C}">
@@ -4445,8 +4503,8 @@
         </p:blipFill>
         <p:spPr>
           <a:xfrm>
-            <a:off x="5085794" y="1401644"/>
-            <a:ext cx="470197" cy="554833"/>
+            <a:off x="5409597" y="154563"/>
+            <a:ext cx="468336" cy="485681"/>
           </a:xfrm>
           <a:prstGeom prst="rect">
             <a:avLst/>
@@ -4455,7 +4513,7 @@
       </p:pic>
       <p:pic>
         <p:nvPicPr>
-          <p:cNvPr id="4" name="Picture 3"/>
+          <p:cNvPr id="6" name="Picture 5"/>
           <p:cNvPicPr>
             <a:picLocks noChangeAspect="1"/>
           </p:cNvPicPr>
@@ -4475,8 +4533,8 @@
         </p:blipFill>
         <p:spPr>
           <a:xfrm>
-            <a:off x="2493343" y="1720134"/>
-            <a:ext cx="525324" cy="596313"/>
+            <a:off x="2469963" y="155710"/>
+            <a:ext cx="537316" cy="644779"/>
           </a:xfrm>
           <a:prstGeom prst="rect">
             <a:avLst/>
@@ -4485,7 +4543,7 @@
       </p:pic>
       <p:pic>
         <p:nvPicPr>
-          <p:cNvPr id="6" name="Picture 5"/>
+          <p:cNvPr id="7" name="Picture 6"/>
           <p:cNvPicPr>
             <a:picLocks noChangeAspect="1"/>
           </p:cNvPicPr>
@@ -4505,8 +4563,8 @@
         </p:blipFill>
         <p:spPr>
           <a:xfrm>
-            <a:off x="2469963" y="155710"/>
-            <a:ext cx="537316" cy="644779"/>
+            <a:off x="2440195" y="3556404"/>
+            <a:ext cx="543291" cy="651949"/>
           </a:xfrm>
           <a:prstGeom prst="rect">
             <a:avLst/>
@@ -4515,7 +4573,7 @@
       </p:pic>
       <p:pic>
         <p:nvPicPr>
-          <p:cNvPr id="7" name="Picture 6"/>
+          <p:cNvPr id="8" name="Picture 7"/>
           <p:cNvPicPr>
             <a:picLocks noChangeAspect="1"/>
           </p:cNvPicPr>
@@ -4535,17 +4593,201 @@
         </p:blipFill>
         <p:spPr>
           <a:xfrm>
-            <a:off x="2517023" y="3875959"/>
-            <a:ext cx="543291" cy="651949"/>
+            <a:off x="6181493" y="3480127"/>
+            <a:ext cx="412804" cy="536981"/>
           </a:xfrm>
           <a:prstGeom prst="rect">
             <a:avLst/>
           </a:prstGeom>
         </p:spPr>
       </p:pic>
+      <p:sp>
+        <p:nvSpPr>
+          <p:cNvPr id="13" name="TextBox 12"/>
+          <p:cNvSpPr txBox="1"/>
+          <p:nvPr/>
+        </p:nvSpPr>
+        <p:spPr>
+          <a:xfrm>
+            <a:off x="2398222" y="4158427"/>
+            <a:ext cx="632012" cy="261610"/>
+          </a:xfrm>
+          <a:prstGeom prst="rect">
+            <a:avLst/>
+          </a:prstGeom>
+          <a:noFill/>
+        </p:spPr>
+        <p:txBody>
+          <a:bodyPr wrap="square" rtlCol="0">
+            <a:spAutoFit/>
+          </a:bodyPr>
+          <a:lstStyle/>
+          <a:p>
+            <a:r>
+              <a:rPr lang="en-US" sz="1050" dirty="0" smtClean="0"/>
+              <a:t>Config</a:t>
+            </a:r>
+            <a:endParaRPr lang="en-US" sz="1050" dirty="0"/>
+          </a:p>
+        </p:txBody>
+      </p:sp>
+      <p:sp>
+        <p:nvSpPr>
+          <p:cNvPr id="16" name="TextBox 15"/>
+          <p:cNvSpPr txBox="1"/>
+          <p:nvPr/>
+        </p:nvSpPr>
+        <p:spPr>
+          <a:xfrm>
+            <a:off x="7320743" y="2063772"/>
+            <a:ext cx="981636" cy="338554"/>
+          </a:xfrm>
+          <a:prstGeom prst="rect">
+            <a:avLst/>
+          </a:prstGeom>
+          <a:noFill/>
+        </p:spPr>
+        <p:txBody>
+          <a:bodyPr wrap="square" rtlCol="0">
+            <a:spAutoFit/>
+          </a:bodyPr>
+          <a:lstStyle/>
+          <a:p>
+            <a:r>
+              <a:rPr lang="en-US" sz="800" b="1" smtClean="0"/>
+              <a:t>Email Notification</a:t>
+            </a:r>
+            <a:endParaRPr lang="en-US" sz="800" b="1"/>
+          </a:p>
+        </p:txBody>
+      </p:sp>
+      <p:sp>
+        <p:nvSpPr>
+          <p:cNvPr id="17" name="TextBox 16"/>
+          <p:cNvSpPr txBox="1"/>
+          <p:nvPr/>
+        </p:nvSpPr>
+        <p:spPr>
+          <a:xfrm>
+            <a:off x="6066005" y="4057574"/>
+            <a:ext cx="643781" cy="274320"/>
+          </a:xfrm>
+          <a:prstGeom prst="rect">
+            <a:avLst/>
+          </a:prstGeom>
+          <a:noFill/>
+        </p:spPr>
+        <p:txBody>
+          <a:bodyPr wrap="square" lIns="0" tIns="0" rIns="0" bIns="0" rtlCol="0" anchor="t">
+            <a:noAutofit/>
+          </a:bodyPr>
+          <a:lstStyle/>
+          <a:p>
+            <a:pPr algn="ctr"/>
+            <a:r>
+              <a:rPr lang="en-US" sz="800" b="1" dirty="0" smtClean="0"/>
+              <a:t>Config Rules</a:t>
+            </a:r>
+            <a:endParaRPr lang="en-US" sz="1400" b="1" dirty="0"/>
+          </a:p>
+        </p:txBody>
+      </p:sp>
+      <p:sp>
+        <p:nvSpPr>
+          <p:cNvPr id="32" name="Rounded Rectangle 31"/>
+          <p:cNvSpPr/>
+          <p:nvPr/>
+        </p:nvSpPr>
+        <p:spPr>
+          <a:xfrm>
+            <a:off x="1680881" y="73959"/>
+            <a:ext cx="6805231" cy="5025635"/>
+          </a:xfrm>
+          <a:prstGeom prst="roundRect">
+            <a:avLst>
+              <a:gd name="adj" fmla="val 9818"/>
+            </a:avLst>
+          </a:prstGeom>
+          <a:noFill/>
+          <a:ln w="19050">
+            <a:solidFill>
+              <a:schemeClr val="tx1"/>
+            </a:solidFill>
+            <a:prstDash val="sysDot"/>
+          </a:ln>
+          <a:effectLst/>
+        </p:spPr>
+        <p:style>
+          <a:lnRef idx="1">
+            <a:schemeClr val="accent1"/>
+          </a:lnRef>
+          <a:fillRef idx="3">
+            <a:schemeClr val="accent1"/>
+          </a:fillRef>
+          <a:effectRef idx="2">
+            <a:schemeClr val="accent1"/>
+          </a:effectRef>
+          <a:fontRef idx="minor">
+            <a:schemeClr val="lt1"/>
+          </a:fontRef>
+        </p:style>
+        <p:txBody>
+          <a:bodyPr anchor="ctr"/>
+          <a:lstStyle/>
+          <a:p>
+            <a:pPr algn="ctr" fontAlgn="auto">
+              <a:spcBef>
+                <a:spcPts val="0"/>
+              </a:spcBef>
+              <a:spcAft>
+                <a:spcPts val="0"/>
+              </a:spcAft>
+              <a:defRPr/>
+            </a:pPr>
+            <a:endParaRPr lang="en-US" dirty="0">
+              <a:solidFill>
+                <a:schemeClr val="tx1"/>
+              </a:solidFill>
+              <a:latin typeface="Helvetica Neue"/>
+              <a:cs typeface="Helvetica Neue"/>
+            </a:endParaRPr>
+          </a:p>
+        </p:txBody>
+      </p:sp>
+      <p:sp>
+        <p:nvSpPr>
+          <p:cNvPr id="92" name="TextBox 91"/>
+          <p:cNvSpPr txBox="1"/>
+          <p:nvPr/>
+        </p:nvSpPr>
+        <p:spPr>
+          <a:xfrm>
+            <a:off x="4269382" y="4017108"/>
+            <a:ext cx="799447" cy="191245"/>
+          </a:xfrm>
+          <a:prstGeom prst="rect">
+            <a:avLst/>
+          </a:prstGeom>
+          <a:noFill/>
+        </p:spPr>
+        <p:txBody>
+          <a:bodyPr wrap="square" lIns="0" tIns="0" rIns="0" bIns="0" rtlCol="0" anchor="t">
+            <a:noAutofit/>
+          </a:bodyPr>
+          <a:lstStyle/>
+          <a:p>
+            <a:pPr algn="ctr"/>
+            <a:r>
+              <a:rPr lang="en-US" sz="800" b="1" dirty="0" smtClean="0"/>
+              <a:t>Lambda functions</a:t>
+            </a:r>
+            <a:endParaRPr lang="en-US" sz="1400" b="1" dirty="0"/>
+          </a:p>
+        </p:txBody>
+      </p:sp>
       <p:pic>
         <p:nvPicPr>
-          <p:cNvPr id="8" name="Picture 7"/>
+          <p:cNvPr id="93" name="Picture 92"/>
           <p:cNvPicPr>
             <a:picLocks noChangeAspect="1"/>
           </p:cNvPicPr>
@@ -4565,361 +4807,24 @@
         </p:blipFill>
         <p:spPr>
           <a:xfrm>
-            <a:off x="6258321" y="3799682"/>
-            <a:ext cx="412804" cy="536981"/>
+            <a:off x="4417868" y="3561914"/>
+            <a:ext cx="429263" cy="446097"/>
           </a:xfrm>
           <a:prstGeom prst="rect">
             <a:avLst/>
           </a:prstGeom>
         </p:spPr>
       </p:pic>
-      <p:pic>
-        <p:nvPicPr>
-          <p:cNvPr id="10" name="Picture 9"/>
-          <p:cNvPicPr>
-            <a:picLocks noChangeAspect="1"/>
-          </p:cNvPicPr>
-          <p:nvPr/>
-        </p:nvPicPr>
-        <p:blipFill>
-          <a:blip r:embed="rId8">
-            <a:extLst>
-              <a:ext uri="{28A0092B-C50C-407E-A947-70E740481C1C}">
-                <a14:useLocalDpi xmlns:a14="http://schemas.microsoft.com/office/drawing/2010/main" val="0"/>
-              </a:ext>
-            </a:extLst>
-          </a:blip>
-          <a:stretch>
-            <a:fillRect/>
-          </a:stretch>
-        </p:blipFill>
-        <p:spPr>
-          <a:xfrm>
-            <a:off x="4562523" y="2543874"/>
-            <a:ext cx="402697" cy="556399"/>
-          </a:xfrm>
-          <a:prstGeom prst="rect">
-            <a:avLst/>
-          </a:prstGeom>
-        </p:spPr>
-      </p:pic>
-      <p:pic>
-        <p:nvPicPr>
-          <p:cNvPr id="11" name="Picture 10"/>
-          <p:cNvPicPr>
-            <a:picLocks noChangeAspect="1"/>
-          </p:cNvPicPr>
-          <p:nvPr/>
-        </p:nvPicPr>
-        <p:blipFill>
-          <a:blip r:embed="rId9">
-            <a:extLst>
-              <a:ext uri="{28A0092B-C50C-407E-A947-70E740481C1C}">
-                <a14:useLocalDpi xmlns:a14="http://schemas.microsoft.com/office/drawing/2010/main" val="0"/>
-              </a:ext>
-            </a:extLst>
-          </a:blip>
-          <a:stretch>
-            <a:fillRect/>
-          </a:stretch>
-        </p:blipFill>
-        <p:spPr>
-          <a:xfrm>
-            <a:off x="6342718" y="2110133"/>
-            <a:ext cx="426236" cy="426236"/>
-          </a:xfrm>
-          <a:prstGeom prst="rect">
-            <a:avLst/>
-          </a:prstGeom>
-        </p:spPr>
-      </p:pic>
-      <p:pic>
-        <p:nvPicPr>
-          <p:cNvPr id="12" name="Picture 11"/>
-          <p:cNvPicPr>
-            <a:picLocks noChangeAspect="1"/>
-          </p:cNvPicPr>
-          <p:nvPr/>
-        </p:nvPicPr>
-        <p:blipFill>
-          <a:blip r:embed="rId10">
-            <a:extLst>
-              <a:ext uri="{28A0092B-C50C-407E-A947-70E740481C1C}">
-                <a14:useLocalDpi xmlns:a14="http://schemas.microsoft.com/office/drawing/2010/main" val="0"/>
-              </a:ext>
-            </a:extLst>
-          </a:blip>
-          <a:stretch>
-            <a:fillRect/>
-          </a:stretch>
-        </p:blipFill>
-        <p:spPr>
-          <a:xfrm>
-            <a:off x="7647507" y="2079517"/>
-            <a:ext cx="539013" cy="337781"/>
-          </a:xfrm>
-          <a:prstGeom prst="rect">
-            <a:avLst/>
-          </a:prstGeom>
-        </p:spPr>
-      </p:pic>
-      <p:sp>
-        <p:nvSpPr>
-          <p:cNvPr id="13" name="TextBox 12"/>
-          <p:cNvSpPr txBox="1"/>
-          <p:nvPr/>
-        </p:nvSpPr>
-        <p:spPr>
-          <a:xfrm>
-            <a:off x="2475050" y="4477982"/>
-            <a:ext cx="632012" cy="261610"/>
-          </a:xfrm>
-          <a:prstGeom prst="rect">
-            <a:avLst/>
-          </a:prstGeom>
-          <a:noFill/>
-        </p:spPr>
-        <p:txBody>
-          <a:bodyPr wrap="square" rtlCol="0">
-            <a:spAutoFit/>
-          </a:bodyPr>
-          <a:lstStyle/>
-          <a:p>
-            <a:r>
-              <a:rPr lang="en-US" sz="1050" dirty="0" smtClean="0"/>
-              <a:t>Config</a:t>
-            </a:r>
-            <a:endParaRPr lang="en-US" sz="1050" dirty="0"/>
-          </a:p>
-        </p:txBody>
-      </p:sp>
-      <p:sp>
-        <p:nvSpPr>
-          <p:cNvPr id="14" name="TextBox 13"/>
-          <p:cNvSpPr txBox="1"/>
-          <p:nvPr/>
-        </p:nvSpPr>
-        <p:spPr>
-          <a:xfrm>
-            <a:off x="2408555" y="768646"/>
-            <a:ext cx="760228" cy="230832"/>
-          </a:xfrm>
-          <a:prstGeom prst="rect">
-            <a:avLst/>
-          </a:prstGeom>
-          <a:noFill/>
-        </p:spPr>
-        <p:txBody>
-          <a:bodyPr wrap="square" rtlCol="0">
-            <a:spAutoFit/>
-          </a:bodyPr>
-          <a:lstStyle/>
-          <a:p>
-            <a:r>
-              <a:rPr lang="en-US" sz="900" b="1" dirty="0" smtClean="0"/>
-              <a:t>Cloudtrail</a:t>
-            </a:r>
-            <a:endParaRPr lang="en-US" sz="900" b="1" dirty="0"/>
-          </a:p>
-        </p:txBody>
-      </p:sp>
-      <p:sp>
-        <p:nvSpPr>
-          <p:cNvPr id="15" name="TextBox 14"/>
-          <p:cNvSpPr txBox="1"/>
-          <p:nvPr/>
-        </p:nvSpPr>
-        <p:spPr>
-          <a:xfrm>
-            <a:off x="6355069" y="2487327"/>
-            <a:ext cx="521367" cy="215444"/>
-          </a:xfrm>
-          <a:prstGeom prst="rect">
-            <a:avLst/>
-          </a:prstGeom>
-          <a:noFill/>
-        </p:spPr>
-        <p:txBody>
-          <a:bodyPr wrap="square" rtlCol="0">
-            <a:spAutoFit/>
-          </a:bodyPr>
-          <a:lstStyle/>
-          <a:p>
-            <a:r>
-              <a:rPr lang="en-US" sz="800" b="1" smtClean="0"/>
-              <a:t>SNS</a:t>
-            </a:r>
-            <a:endParaRPr lang="en-US" sz="800" b="1"/>
-          </a:p>
-        </p:txBody>
-      </p:sp>
-      <p:sp>
-        <p:nvSpPr>
-          <p:cNvPr id="16" name="TextBox 15"/>
-          <p:cNvSpPr txBox="1"/>
-          <p:nvPr/>
-        </p:nvSpPr>
-        <p:spPr>
-          <a:xfrm>
-            <a:off x="7612052" y="2395027"/>
-            <a:ext cx="981636" cy="338554"/>
-          </a:xfrm>
-          <a:prstGeom prst="rect">
-            <a:avLst/>
-          </a:prstGeom>
-          <a:noFill/>
-        </p:spPr>
-        <p:txBody>
-          <a:bodyPr wrap="square" rtlCol="0">
-            <a:spAutoFit/>
-          </a:bodyPr>
-          <a:lstStyle/>
-          <a:p>
-            <a:r>
-              <a:rPr lang="en-US" sz="800" b="1" smtClean="0"/>
-              <a:t>Email Notification</a:t>
-            </a:r>
-            <a:endParaRPr lang="en-US" sz="800" b="1"/>
-          </a:p>
-        </p:txBody>
-      </p:sp>
-      <p:sp>
-        <p:nvSpPr>
-          <p:cNvPr id="17" name="TextBox 16"/>
-          <p:cNvSpPr txBox="1"/>
-          <p:nvPr/>
-        </p:nvSpPr>
-        <p:spPr>
-          <a:xfrm>
-            <a:off x="6142833" y="4377129"/>
-            <a:ext cx="643781" cy="274320"/>
-          </a:xfrm>
-          <a:prstGeom prst="rect">
-            <a:avLst/>
-          </a:prstGeom>
-          <a:noFill/>
-        </p:spPr>
-        <p:txBody>
-          <a:bodyPr wrap="square" lIns="0" tIns="0" rIns="0" bIns="0" rtlCol="0" anchor="t">
-            <a:noAutofit/>
-          </a:bodyPr>
-          <a:lstStyle/>
-          <a:p>
-            <a:pPr algn="ctr"/>
-            <a:r>
-              <a:rPr lang="en-US" sz="800" b="1" dirty="0" smtClean="0"/>
-              <a:t>Config Rules</a:t>
-            </a:r>
-            <a:endParaRPr lang="en-US" sz="1400" b="1" dirty="0"/>
-          </a:p>
-        </p:txBody>
-      </p:sp>
-      <p:sp>
-        <p:nvSpPr>
-          <p:cNvPr id="18" name="TextBox 17"/>
-          <p:cNvSpPr txBox="1"/>
-          <p:nvPr/>
-        </p:nvSpPr>
-        <p:spPr>
-          <a:xfrm>
-            <a:off x="4399934" y="3130918"/>
-            <a:ext cx="743565" cy="156884"/>
-          </a:xfrm>
-          <a:prstGeom prst="rect">
-            <a:avLst/>
-          </a:prstGeom>
-          <a:noFill/>
-        </p:spPr>
-        <p:txBody>
-          <a:bodyPr wrap="square" lIns="0" tIns="0" rIns="0" bIns="0" rtlCol="0" anchor="t">
-            <a:noAutofit/>
-          </a:bodyPr>
-          <a:lstStyle/>
-          <a:p>
-            <a:pPr algn="ctr"/>
-            <a:r>
-              <a:rPr lang="en-US" sz="800" b="1" dirty="0" smtClean="0"/>
-              <a:t>Event Rules</a:t>
-            </a:r>
-            <a:endParaRPr lang="en-US" sz="1400" b="1" dirty="0"/>
-          </a:p>
-        </p:txBody>
-      </p:sp>
-      <p:sp>
-        <p:nvSpPr>
-          <p:cNvPr id="21" name="TextBox 20"/>
-          <p:cNvSpPr txBox="1"/>
-          <p:nvPr/>
-        </p:nvSpPr>
-        <p:spPr>
-          <a:xfrm>
-            <a:off x="2185950" y="2364243"/>
-            <a:ext cx="1041341" cy="392400"/>
-          </a:xfrm>
-          <a:prstGeom prst="rect">
-            <a:avLst/>
-          </a:prstGeom>
-          <a:noFill/>
-        </p:spPr>
-        <p:txBody>
-          <a:bodyPr wrap="square" lIns="0" tIns="0" rIns="0" bIns="0" rtlCol="0" anchor="t">
-            <a:noAutofit/>
-          </a:bodyPr>
-          <a:lstStyle/>
-          <a:p>
-            <a:pPr algn="ctr"/>
-            <a:r>
-              <a:rPr lang="en-US" sz="900" b="1" dirty="0"/>
-              <a:t>Amazon </a:t>
-            </a:r>
-            <a:r>
-              <a:rPr lang="en-US" sz="900" b="1" dirty="0" smtClean="0"/>
-              <a:t>CloudWatch</a:t>
-            </a:r>
-            <a:endParaRPr lang="en-US" sz="900" b="1" dirty="0"/>
-          </a:p>
-        </p:txBody>
-      </p:sp>
-      <p:sp>
-        <p:nvSpPr>
-          <p:cNvPr id="22" name="TextBox 21"/>
-          <p:cNvSpPr txBox="1"/>
-          <p:nvPr/>
-        </p:nvSpPr>
-        <p:spPr>
-          <a:xfrm>
-            <a:off x="5499850" y="625659"/>
-            <a:ext cx="378084" cy="246221"/>
-          </a:xfrm>
-          <a:prstGeom prst="rect">
-            <a:avLst/>
-          </a:prstGeom>
-          <a:noFill/>
-        </p:spPr>
-        <p:txBody>
-          <a:bodyPr wrap="square" rtlCol="0">
-            <a:spAutoFit/>
-          </a:bodyPr>
-          <a:lstStyle/>
-          <a:p>
-            <a:r>
-              <a:rPr lang="en-US" sz="1000" smtClean="0"/>
-              <a:t>S3</a:t>
-            </a:r>
-            <a:endParaRPr lang="en-US" sz="1000"/>
-          </a:p>
-        </p:txBody>
-      </p:sp>
       <p:cxnSp>
         <p:nvCxnSpPr>
-          <p:cNvPr id="24" name="Straight Arrow Connector 23"/>
+          <p:cNvPr id="97" name="Straight Arrow Connector 96"/>
           <p:cNvCxnSpPr/>
           <p:nvPr/>
         </p:nvCxnSpPr>
         <p:spPr>
           <a:xfrm>
-            <a:off x="3168783" y="435091"/>
-            <a:ext cx="2169563" cy="0"/>
+            <a:off x="3148878" y="3830313"/>
+            <a:ext cx="1061575" cy="10742"/>
           </a:xfrm>
           <a:prstGeom prst="straightConnector1">
             <a:avLst/>
@@ -4928,683 +4833,6 @@
             <a:solidFill>
               <a:schemeClr val="tx1"/>
             </a:solidFill>
-            <a:tailEnd type="triangle"/>
-          </a:ln>
-        </p:spPr>
-        <p:style>
-          <a:lnRef idx="2">
-            <a:schemeClr val="accent1"/>
-          </a:lnRef>
-          <a:fillRef idx="0">
-            <a:schemeClr val="accent1"/>
-          </a:fillRef>
-          <a:effectRef idx="1">
-            <a:schemeClr val="accent1"/>
-          </a:effectRef>
-          <a:fontRef idx="minor">
-            <a:schemeClr val="tx1"/>
-          </a:fontRef>
-        </p:style>
-      </p:cxnSp>
-      <p:cxnSp>
-        <p:nvCxnSpPr>
-          <p:cNvPr id="30" name="Straight Arrow Connector 29"/>
-          <p:cNvCxnSpPr/>
-          <p:nvPr/>
-        </p:nvCxnSpPr>
-        <p:spPr>
-          <a:xfrm flipH="1">
-            <a:off x="2756647" y="1062313"/>
-            <a:ext cx="6724" cy="616748"/>
-          </a:xfrm>
-          <a:prstGeom prst="straightConnector1">
-            <a:avLst/>
-          </a:prstGeom>
-          <a:ln>
-            <a:solidFill>
-              <a:schemeClr val="tx1"/>
-            </a:solidFill>
-            <a:tailEnd type="triangle"/>
-          </a:ln>
-        </p:spPr>
-        <p:style>
-          <a:lnRef idx="2">
-            <a:schemeClr val="accent1"/>
-          </a:lnRef>
-          <a:fillRef idx="0">
-            <a:schemeClr val="accent1"/>
-          </a:fillRef>
-          <a:effectRef idx="1">
-            <a:schemeClr val="accent1"/>
-          </a:effectRef>
-          <a:fontRef idx="minor">
-            <a:schemeClr val="tx1"/>
-          </a:fontRef>
-        </p:style>
-      </p:cxnSp>
-      <p:sp>
-        <p:nvSpPr>
-          <p:cNvPr id="32" name="Rounded Rectangle 31"/>
-          <p:cNvSpPr/>
-          <p:nvPr/>
-        </p:nvSpPr>
-        <p:spPr>
-          <a:xfrm>
-            <a:off x="1680881" y="73959"/>
-            <a:ext cx="6805231" cy="5025635"/>
-          </a:xfrm>
-          <a:prstGeom prst="roundRect">
-            <a:avLst>
-              <a:gd name="adj" fmla="val 9818"/>
-            </a:avLst>
-          </a:prstGeom>
-          <a:noFill/>
-          <a:ln w="19050">
-            <a:solidFill>
-              <a:schemeClr val="tx1"/>
-            </a:solidFill>
-            <a:prstDash val="sysDot"/>
-          </a:ln>
-          <a:effectLst/>
-        </p:spPr>
-        <p:style>
-          <a:lnRef idx="1">
-            <a:schemeClr val="accent1"/>
-          </a:lnRef>
-          <a:fillRef idx="3">
-            <a:schemeClr val="accent1"/>
-          </a:fillRef>
-          <a:effectRef idx="2">
-            <a:schemeClr val="accent1"/>
-          </a:effectRef>
-          <a:fontRef idx="minor">
-            <a:schemeClr val="lt1"/>
-          </a:fontRef>
-        </p:style>
-        <p:txBody>
-          <a:bodyPr anchor="ctr"/>
-          <a:lstStyle/>
-          <a:p>
-            <a:pPr algn="ctr" fontAlgn="auto">
-              <a:spcBef>
-                <a:spcPts val="0"/>
-              </a:spcBef>
-              <a:spcAft>
-                <a:spcPts val="0"/>
-              </a:spcAft>
-              <a:defRPr/>
-            </a:pPr>
-            <a:endParaRPr lang="en-US" dirty="0">
-              <a:solidFill>
-                <a:schemeClr val="tx1"/>
-              </a:solidFill>
-              <a:latin typeface="Helvetica Neue"/>
-              <a:cs typeface="Helvetica Neue"/>
-            </a:endParaRPr>
-          </a:p>
-        </p:txBody>
-      </p:sp>
-      <p:cxnSp>
-        <p:nvCxnSpPr>
-          <p:cNvPr id="36" name="Straight Connector 35"/>
-          <p:cNvCxnSpPr/>
-          <p:nvPr/>
-        </p:nvCxnSpPr>
-        <p:spPr>
-          <a:xfrm>
-            <a:off x="3334871" y="2316447"/>
-            <a:ext cx="874058" cy="0"/>
-          </a:xfrm>
-          <a:prstGeom prst="line">
-            <a:avLst/>
-          </a:prstGeom>
-          <a:ln>
-            <a:solidFill>
-              <a:schemeClr val="tx1"/>
-            </a:solidFill>
-          </a:ln>
-        </p:spPr>
-        <p:style>
-          <a:lnRef idx="2">
-            <a:schemeClr val="accent1"/>
-          </a:lnRef>
-          <a:fillRef idx="0">
-            <a:schemeClr val="accent1"/>
-          </a:fillRef>
-          <a:effectRef idx="1">
-            <a:schemeClr val="accent1"/>
-          </a:effectRef>
-          <a:fontRef idx="minor">
-            <a:schemeClr val="tx1"/>
-          </a:fontRef>
-        </p:style>
-      </p:cxnSp>
-      <p:cxnSp>
-        <p:nvCxnSpPr>
-          <p:cNvPr id="47" name="Straight Arrow Connector 46"/>
-          <p:cNvCxnSpPr/>
-          <p:nvPr/>
-        </p:nvCxnSpPr>
-        <p:spPr>
-          <a:xfrm>
-            <a:off x="7012641" y="2294830"/>
-            <a:ext cx="558053" cy="0"/>
-          </a:xfrm>
-          <a:prstGeom prst="straightConnector1">
-            <a:avLst/>
-          </a:prstGeom>
-          <a:ln>
-            <a:solidFill>
-              <a:schemeClr val="tx1"/>
-            </a:solidFill>
-            <a:tailEnd type="triangle"/>
-          </a:ln>
-        </p:spPr>
-        <p:style>
-          <a:lnRef idx="2">
-            <a:schemeClr val="accent1"/>
-          </a:lnRef>
-          <a:fillRef idx="0">
-            <a:schemeClr val="accent1"/>
-          </a:fillRef>
-          <a:effectRef idx="1">
-            <a:schemeClr val="accent1"/>
-          </a:effectRef>
-          <a:fontRef idx="minor">
-            <a:schemeClr val="tx1"/>
-          </a:fontRef>
-        </p:style>
-      </p:cxnSp>
-      <p:sp>
-        <p:nvSpPr>
-          <p:cNvPr id="55" name="TextBox 54"/>
-          <p:cNvSpPr txBox="1"/>
-          <p:nvPr/>
-        </p:nvSpPr>
-        <p:spPr>
-          <a:xfrm>
-            <a:off x="5423068" y="3122749"/>
-            <a:ext cx="799447" cy="191245"/>
-          </a:xfrm>
-          <a:prstGeom prst="rect">
-            <a:avLst/>
-          </a:prstGeom>
-          <a:noFill/>
-        </p:spPr>
-        <p:txBody>
-          <a:bodyPr wrap="square" lIns="0" tIns="0" rIns="0" bIns="0" rtlCol="0" anchor="t">
-            <a:noAutofit/>
-          </a:bodyPr>
-          <a:lstStyle/>
-          <a:p>
-            <a:pPr algn="ctr"/>
-            <a:r>
-              <a:rPr lang="en-US" sz="800" b="1" dirty="0" smtClean="0"/>
-              <a:t>Custom Lambda functions</a:t>
-            </a:r>
-            <a:endParaRPr lang="en-US" sz="1400" b="1" dirty="0"/>
-          </a:p>
-        </p:txBody>
-      </p:sp>
-      <p:pic>
-        <p:nvPicPr>
-          <p:cNvPr id="56" name="Picture 55"/>
-          <p:cNvPicPr>
-            <a:picLocks noChangeAspect="1"/>
-          </p:cNvPicPr>
-          <p:nvPr/>
-        </p:nvPicPr>
-        <p:blipFill>
-          <a:blip r:embed="rId11">
-            <a:extLst>
-              <a:ext uri="{28A0092B-C50C-407E-A947-70E740481C1C}">
-                <a14:useLocalDpi xmlns:a14="http://schemas.microsoft.com/office/drawing/2010/main" val="0"/>
-              </a:ext>
-            </a:extLst>
-          </a:blip>
-          <a:stretch>
-            <a:fillRect/>
-          </a:stretch>
-        </p:blipFill>
-        <p:spPr>
-          <a:xfrm>
-            <a:off x="5585001" y="2667555"/>
-            <a:ext cx="429263" cy="446097"/>
-          </a:xfrm>
-          <a:prstGeom prst="rect">
-            <a:avLst/>
-          </a:prstGeom>
-        </p:spPr>
-      </p:pic>
-      <p:cxnSp>
-        <p:nvCxnSpPr>
-          <p:cNvPr id="59" name="Straight Arrow Connector 58"/>
-          <p:cNvCxnSpPr/>
-          <p:nvPr/>
-        </p:nvCxnSpPr>
-        <p:spPr>
-          <a:xfrm flipV="1">
-            <a:off x="5047616" y="2889409"/>
-            <a:ext cx="451754" cy="1354"/>
-          </a:xfrm>
-          <a:prstGeom prst="straightConnector1">
-            <a:avLst/>
-          </a:prstGeom>
-          <a:ln>
-            <a:solidFill>
-              <a:schemeClr val="tx1"/>
-            </a:solidFill>
-            <a:tailEnd type="triangle"/>
-          </a:ln>
-        </p:spPr>
-        <p:style>
-          <a:lnRef idx="2">
-            <a:schemeClr val="accent1"/>
-          </a:lnRef>
-          <a:fillRef idx="0">
-            <a:schemeClr val="accent1"/>
-          </a:fillRef>
-          <a:effectRef idx="1">
-            <a:schemeClr val="accent1"/>
-          </a:effectRef>
-          <a:fontRef idx="minor">
-            <a:schemeClr val="tx1"/>
-          </a:fontRef>
-        </p:style>
-      </p:cxnSp>
-      <p:cxnSp>
-        <p:nvCxnSpPr>
-          <p:cNvPr id="69" name="Straight Connector 68"/>
-          <p:cNvCxnSpPr/>
-          <p:nvPr/>
-        </p:nvCxnSpPr>
-        <p:spPr>
-          <a:xfrm flipV="1">
-            <a:off x="4208929" y="1778016"/>
-            <a:ext cx="0" cy="538431"/>
-          </a:xfrm>
-          <a:prstGeom prst="line">
-            <a:avLst/>
-          </a:prstGeom>
-          <a:ln>
-            <a:solidFill>
-              <a:schemeClr val="tx1"/>
-            </a:solidFill>
-          </a:ln>
-        </p:spPr>
-        <p:style>
-          <a:lnRef idx="2">
-            <a:schemeClr val="accent1"/>
-          </a:lnRef>
-          <a:fillRef idx="0">
-            <a:schemeClr val="accent1"/>
-          </a:fillRef>
-          <a:effectRef idx="1">
-            <a:schemeClr val="accent1"/>
-          </a:effectRef>
-          <a:fontRef idx="minor">
-            <a:schemeClr val="tx1"/>
-          </a:fontRef>
-        </p:style>
-      </p:cxnSp>
-      <p:cxnSp>
-        <p:nvCxnSpPr>
-          <p:cNvPr id="71" name="Straight Connector 70"/>
-          <p:cNvCxnSpPr/>
-          <p:nvPr/>
-        </p:nvCxnSpPr>
-        <p:spPr>
-          <a:xfrm flipV="1">
-            <a:off x="4206687" y="2316447"/>
-            <a:ext cx="0" cy="564923"/>
-          </a:xfrm>
-          <a:prstGeom prst="line">
-            <a:avLst/>
-          </a:prstGeom>
-          <a:ln>
-            <a:solidFill>
-              <a:schemeClr val="tx1"/>
-            </a:solidFill>
-          </a:ln>
-        </p:spPr>
-        <p:style>
-          <a:lnRef idx="2">
-            <a:schemeClr val="accent1"/>
-          </a:lnRef>
-          <a:fillRef idx="0">
-            <a:schemeClr val="accent1"/>
-          </a:fillRef>
-          <a:effectRef idx="1">
-            <a:schemeClr val="accent1"/>
-          </a:effectRef>
-          <a:fontRef idx="minor">
-            <a:schemeClr val="tx1"/>
-          </a:fontRef>
-        </p:style>
-      </p:cxnSp>
-      <p:cxnSp>
-        <p:nvCxnSpPr>
-          <p:cNvPr id="75" name="Straight Connector 74"/>
-          <p:cNvCxnSpPr/>
-          <p:nvPr/>
-        </p:nvCxnSpPr>
-        <p:spPr>
-          <a:xfrm flipV="1">
-            <a:off x="4206687" y="2881174"/>
-            <a:ext cx="279570" cy="195"/>
-          </a:xfrm>
-          <a:prstGeom prst="line">
-            <a:avLst/>
-          </a:prstGeom>
-          <a:ln>
-            <a:solidFill>
-              <a:schemeClr val="tx1"/>
-            </a:solidFill>
-            <a:headEnd type="none" w="med" len="med"/>
-            <a:tailEnd type="triangle" w="med" len="med"/>
-          </a:ln>
-        </p:spPr>
-        <p:style>
-          <a:lnRef idx="2">
-            <a:schemeClr val="accent1"/>
-          </a:lnRef>
-          <a:fillRef idx="0">
-            <a:schemeClr val="accent1"/>
-          </a:fillRef>
-          <a:effectRef idx="1">
-            <a:schemeClr val="accent1"/>
-          </a:effectRef>
-          <a:fontRef idx="minor">
-            <a:schemeClr val="tx1"/>
-          </a:fontRef>
-        </p:style>
-      </p:cxnSp>
-      <p:cxnSp>
-        <p:nvCxnSpPr>
-          <p:cNvPr id="78" name="Straight Connector 77"/>
-          <p:cNvCxnSpPr/>
-          <p:nvPr/>
-        </p:nvCxnSpPr>
-        <p:spPr>
-          <a:xfrm>
-            <a:off x="4200381" y="1784322"/>
-            <a:ext cx="801042" cy="0"/>
-          </a:xfrm>
-          <a:prstGeom prst="line">
-            <a:avLst/>
-          </a:prstGeom>
-          <a:ln>
-            <a:solidFill>
-              <a:schemeClr val="tx1"/>
-            </a:solidFill>
-            <a:headEnd type="none" w="med" len="med"/>
-            <a:tailEnd type="triangle" w="med" len="med"/>
-          </a:ln>
-        </p:spPr>
-        <p:style>
-          <a:lnRef idx="2">
-            <a:schemeClr val="accent1"/>
-          </a:lnRef>
-          <a:fillRef idx="0">
-            <a:schemeClr val="accent1"/>
-          </a:fillRef>
-          <a:effectRef idx="1">
-            <a:schemeClr val="accent1"/>
-          </a:effectRef>
-          <a:fontRef idx="minor">
-            <a:schemeClr val="tx1"/>
-          </a:fontRef>
-        </p:style>
-      </p:cxnSp>
-      <p:cxnSp>
-        <p:nvCxnSpPr>
-          <p:cNvPr id="80" name="Straight Connector 79"/>
-          <p:cNvCxnSpPr/>
-          <p:nvPr/>
-        </p:nvCxnSpPr>
-        <p:spPr>
-          <a:xfrm>
-            <a:off x="5679418" y="1778016"/>
-            <a:ext cx="801042" cy="0"/>
-          </a:xfrm>
-          <a:prstGeom prst="line">
-            <a:avLst/>
-          </a:prstGeom>
-          <a:ln>
-            <a:solidFill>
-              <a:schemeClr val="tx1"/>
-            </a:solidFill>
-          </a:ln>
-        </p:spPr>
-        <p:style>
-          <a:lnRef idx="2">
-            <a:schemeClr val="accent1"/>
-          </a:lnRef>
-          <a:fillRef idx="0">
-            <a:schemeClr val="accent1"/>
-          </a:fillRef>
-          <a:effectRef idx="1">
-            <a:schemeClr val="accent1"/>
-          </a:effectRef>
-          <a:fontRef idx="minor">
-            <a:schemeClr val="tx1"/>
-          </a:fontRef>
-        </p:style>
-      </p:cxnSp>
-      <p:cxnSp>
-        <p:nvCxnSpPr>
-          <p:cNvPr id="82" name="Straight Arrow Connector 81"/>
-          <p:cNvCxnSpPr/>
-          <p:nvPr/>
-        </p:nvCxnSpPr>
-        <p:spPr>
-          <a:xfrm flipH="1">
-            <a:off x="6472311" y="1778016"/>
-            <a:ext cx="1010" cy="332117"/>
-          </a:xfrm>
-          <a:prstGeom prst="straightConnector1">
-            <a:avLst/>
-          </a:prstGeom>
-          <a:ln>
-            <a:solidFill>
-              <a:schemeClr val="tx1"/>
-            </a:solidFill>
-            <a:tailEnd type="triangle"/>
-          </a:ln>
-        </p:spPr>
-        <p:style>
-          <a:lnRef idx="2">
-            <a:schemeClr val="accent1"/>
-          </a:lnRef>
-          <a:fillRef idx="0">
-            <a:schemeClr val="accent1"/>
-          </a:fillRef>
-          <a:effectRef idx="1">
-            <a:schemeClr val="accent1"/>
-          </a:effectRef>
-          <a:fontRef idx="minor">
-            <a:schemeClr val="tx1"/>
-          </a:fontRef>
-        </p:style>
-      </p:cxnSp>
-      <p:cxnSp>
-        <p:nvCxnSpPr>
-          <p:cNvPr id="85" name="Straight Connector 84"/>
-          <p:cNvCxnSpPr/>
-          <p:nvPr/>
-        </p:nvCxnSpPr>
-        <p:spPr>
-          <a:xfrm>
-            <a:off x="6084794" y="2881174"/>
-            <a:ext cx="417290" cy="0"/>
-          </a:xfrm>
-          <a:prstGeom prst="line">
-            <a:avLst/>
-          </a:prstGeom>
-          <a:ln>
-            <a:solidFill>
-              <a:schemeClr val="tx1"/>
-            </a:solidFill>
-          </a:ln>
-        </p:spPr>
-        <p:style>
-          <a:lnRef idx="2">
-            <a:schemeClr val="accent1"/>
-          </a:lnRef>
-          <a:fillRef idx="0">
-            <a:schemeClr val="accent1"/>
-          </a:fillRef>
-          <a:effectRef idx="1">
-            <a:schemeClr val="accent1"/>
-          </a:effectRef>
-          <a:fontRef idx="minor">
-            <a:schemeClr val="tx1"/>
-          </a:fontRef>
-        </p:style>
-      </p:cxnSp>
-      <p:cxnSp>
-        <p:nvCxnSpPr>
-          <p:cNvPr id="88" name="Straight Arrow Connector 87"/>
-          <p:cNvCxnSpPr/>
-          <p:nvPr/>
-        </p:nvCxnSpPr>
-        <p:spPr>
-          <a:xfrm flipV="1">
-            <a:off x="6494930" y="2685163"/>
-            <a:ext cx="7154" cy="196012"/>
-          </a:xfrm>
-          <a:prstGeom prst="straightConnector1">
-            <a:avLst/>
-          </a:prstGeom>
-          <a:ln>
-            <a:solidFill>
-              <a:schemeClr val="tx1"/>
-            </a:solidFill>
-            <a:tailEnd type="triangle"/>
-          </a:ln>
-        </p:spPr>
-        <p:style>
-          <a:lnRef idx="2">
-            <a:schemeClr val="accent1"/>
-          </a:lnRef>
-          <a:fillRef idx="0">
-            <a:schemeClr val="accent1"/>
-          </a:fillRef>
-          <a:effectRef idx="1">
-            <a:schemeClr val="accent1"/>
-          </a:effectRef>
-          <a:fontRef idx="minor">
-            <a:schemeClr val="tx1"/>
-          </a:fontRef>
-        </p:style>
-      </p:cxnSp>
-      <p:sp>
-        <p:nvSpPr>
-          <p:cNvPr id="91" name="TextBox 90"/>
-          <p:cNvSpPr txBox="1"/>
-          <p:nvPr/>
-        </p:nvSpPr>
-        <p:spPr>
-          <a:xfrm>
-            <a:off x="4917687" y="2004061"/>
-            <a:ext cx="743565" cy="156884"/>
-          </a:xfrm>
-          <a:prstGeom prst="rect">
-            <a:avLst/>
-          </a:prstGeom>
-          <a:noFill/>
-        </p:spPr>
-        <p:txBody>
-          <a:bodyPr wrap="square" lIns="0" tIns="0" rIns="0" bIns="0" rtlCol="0" anchor="t">
-            <a:noAutofit/>
-          </a:bodyPr>
-          <a:lstStyle/>
-          <a:p>
-            <a:pPr algn="ctr"/>
-            <a:r>
-              <a:rPr lang="en-US" sz="800" b="1" dirty="0" smtClean="0"/>
-              <a:t>Alarms</a:t>
-            </a:r>
-            <a:endParaRPr lang="en-US" sz="1400" b="1" dirty="0"/>
-          </a:p>
-        </p:txBody>
-      </p:sp>
-      <p:sp>
-        <p:nvSpPr>
-          <p:cNvPr id="92" name="TextBox 91"/>
-          <p:cNvSpPr txBox="1"/>
-          <p:nvPr/>
-        </p:nvSpPr>
-        <p:spPr>
-          <a:xfrm>
-            <a:off x="4346210" y="4336663"/>
-            <a:ext cx="799447" cy="191245"/>
-          </a:xfrm>
-          <a:prstGeom prst="rect">
-            <a:avLst/>
-          </a:prstGeom>
-          <a:noFill/>
-        </p:spPr>
-        <p:txBody>
-          <a:bodyPr wrap="square" lIns="0" tIns="0" rIns="0" bIns="0" rtlCol="0" anchor="t">
-            <a:noAutofit/>
-          </a:bodyPr>
-          <a:lstStyle/>
-          <a:p>
-            <a:pPr algn="ctr"/>
-            <a:r>
-              <a:rPr lang="en-US" sz="800" b="1" dirty="0" smtClean="0"/>
-              <a:t>Lambda functions</a:t>
-            </a:r>
-            <a:endParaRPr lang="en-US" sz="1400" b="1" dirty="0"/>
-          </a:p>
-        </p:txBody>
-      </p:sp>
-      <p:pic>
-        <p:nvPicPr>
-          <p:cNvPr id="93" name="Picture 92"/>
-          <p:cNvPicPr>
-            <a:picLocks noChangeAspect="1"/>
-          </p:cNvPicPr>
-          <p:nvPr/>
-        </p:nvPicPr>
-        <p:blipFill>
-          <a:blip r:embed="rId11">
-            <a:extLst>
-              <a:ext uri="{28A0092B-C50C-407E-A947-70E740481C1C}">
-                <a14:useLocalDpi xmlns:a14="http://schemas.microsoft.com/office/drawing/2010/main" val="0"/>
-              </a:ext>
-            </a:extLst>
-          </a:blip>
-          <a:stretch>
-            <a:fillRect/>
-          </a:stretch>
-        </p:blipFill>
-        <p:spPr>
-          <a:xfrm>
-            <a:off x="4494696" y="3881469"/>
-            <a:ext cx="429263" cy="446097"/>
-          </a:xfrm>
-          <a:prstGeom prst="rect">
-            <a:avLst/>
-          </a:prstGeom>
-        </p:spPr>
-      </p:pic>
-      <p:cxnSp>
-        <p:nvCxnSpPr>
-          <p:cNvPr id="97" name="Straight Arrow Connector 96"/>
-          <p:cNvCxnSpPr/>
-          <p:nvPr/>
-        </p:nvCxnSpPr>
-        <p:spPr>
-          <a:xfrm>
-            <a:off x="3225706" y="4149868"/>
-            <a:ext cx="1061575" cy="10742"/>
-          </a:xfrm>
-          <a:prstGeom prst="straightConnector1">
-            <a:avLst/>
-          </a:prstGeom>
-          <a:ln>
             <a:tailEnd type="triangle"/>
           </a:ln>
         </p:spPr>
@@ -5631,8 +4859,8 @@
         </p:nvSpPr>
         <p:spPr>
           <a:xfrm>
-            <a:off x="3334871" y="3803913"/>
-            <a:ext cx="871816" cy="369332"/>
+            <a:off x="3258043" y="3484358"/>
+            <a:ext cx="871816" cy="338554"/>
           </a:xfrm>
           <a:prstGeom prst="rect">
             <a:avLst/>
@@ -5646,10 +4874,10 @@
           <a:lstStyle/>
           <a:p>
             <a:r>
-              <a:rPr lang="en-US" sz="900" b="1" smtClean="0"/>
+              <a:rPr lang="en-US" sz="800" b="1" dirty="0" smtClean="0"/>
               <a:t>Custom Config rules</a:t>
             </a:r>
-            <a:endParaRPr lang="en-US" sz="900" b="1" dirty="0"/>
+            <a:endParaRPr lang="en-US" sz="800" b="1" dirty="0"/>
           </a:p>
         </p:txBody>
       </p:sp>
@@ -5661,13 +4889,1065 @@
         </p:nvCxnSpPr>
         <p:spPr>
           <a:xfrm>
-            <a:off x="5143499" y="4131413"/>
+            <a:off x="5066671" y="3837082"/>
             <a:ext cx="941295" cy="0"/>
           </a:xfrm>
           <a:prstGeom prst="straightConnector1">
             <a:avLst/>
           </a:prstGeom>
           <a:ln>
+            <a:solidFill>
+              <a:schemeClr val="tx1"/>
+            </a:solidFill>
+            <a:tailEnd type="triangle"/>
+          </a:ln>
+        </p:spPr>
+        <p:style>
+          <a:lnRef idx="2">
+            <a:schemeClr val="accent1"/>
+          </a:lnRef>
+          <a:fillRef idx="0">
+            <a:schemeClr val="accent1"/>
+          </a:fillRef>
+          <a:effectRef idx="1">
+            <a:schemeClr val="accent1"/>
+          </a:effectRef>
+          <a:fontRef idx="minor">
+            <a:schemeClr val="tx1"/>
+          </a:fontRef>
+        </p:style>
+      </p:cxnSp>
+      <p:grpSp>
+        <p:nvGrpSpPr>
+          <p:cNvPr id="5" name="Group 4"/>
+          <p:cNvGrpSpPr/>
+          <p:nvPr/>
+        </p:nvGrpSpPr>
+        <p:grpSpPr>
+          <a:xfrm>
+            <a:off x="2185950" y="435091"/>
+            <a:ext cx="5722033" cy="2396411"/>
+            <a:chOff x="2185950" y="435091"/>
+            <a:chExt cx="6000570" cy="2878903"/>
+          </a:xfrm>
+        </p:grpSpPr>
+        <p:pic>
+          <p:nvPicPr>
+            <p:cNvPr id="3" name="Picture 2"/>
+            <p:cNvPicPr>
+              <a:picLocks noChangeAspect="1"/>
+            </p:cNvPicPr>
+            <p:nvPr/>
+          </p:nvPicPr>
+          <p:blipFill>
+            <a:blip r:embed="rId8">
+              <a:extLst>
+                <a:ext uri="{28A0092B-C50C-407E-A947-70E740481C1C}">
+                  <a14:useLocalDpi xmlns:a14="http://schemas.microsoft.com/office/drawing/2010/main" val="0"/>
+                </a:ext>
+              </a:extLst>
+            </a:blip>
+            <a:stretch>
+              <a:fillRect/>
+            </a:stretch>
+          </p:blipFill>
+          <p:spPr>
+            <a:xfrm>
+              <a:off x="5085794" y="1401644"/>
+              <a:ext cx="470197" cy="554833"/>
+            </a:xfrm>
+            <a:prstGeom prst="rect">
+              <a:avLst/>
+            </a:prstGeom>
+          </p:spPr>
+        </p:pic>
+        <p:pic>
+          <p:nvPicPr>
+            <p:cNvPr id="4" name="Picture 3"/>
+            <p:cNvPicPr>
+              <a:picLocks noChangeAspect="1"/>
+            </p:cNvPicPr>
+            <p:nvPr/>
+          </p:nvPicPr>
+          <p:blipFill>
+            <a:blip r:embed="rId9">
+              <a:extLst>
+                <a:ext uri="{28A0092B-C50C-407E-A947-70E740481C1C}">
+                  <a14:useLocalDpi xmlns:a14="http://schemas.microsoft.com/office/drawing/2010/main" val="0"/>
+                </a:ext>
+              </a:extLst>
+            </a:blip>
+            <a:stretch>
+              <a:fillRect/>
+            </a:stretch>
+          </p:blipFill>
+          <p:spPr>
+            <a:xfrm>
+              <a:off x="2493343" y="1720134"/>
+              <a:ext cx="525324" cy="596313"/>
+            </a:xfrm>
+            <a:prstGeom prst="rect">
+              <a:avLst/>
+            </a:prstGeom>
+          </p:spPr>
+        </p:pic>
+        <p:pic>
+          <p:nvPicPr>
+            <p:cNvPr id="10" name="Picture 9"/>
+            <p:cNvPicPr>
+              <a:picLocks noChangeAspect="1"/>
+            </p:cNvPicPr>
+            <p:nvPr/>
+          </p:nvPicPr>
+          <p:blipFill>
+            <a:blip r:embed="rId10">
+              <a:extLst>
+                <a:ext uri="{28A0092B-C50C-407E-A947-70E740481C1C}">
+                  <a14:useLocalDpi xmlns:a14="http://schemas.microsoft.com/office/drawing/2010/main" val="0"/>
+                </a:ext>
+              </a:extLst>
+            </a:blip>
+            <a:stretch>
+              <a:fillRect/>
+            </a:stretch>
+          </p:blipFill>
+          <p:spPr>
+            <a:xfrm>
+              <a:off x="4562523" y="2543874"/>
+              <a:ext cx="402697" cy="556399"/>
+            </a:xfrm>
+            <a:prstGeom prst="rect">
+              <a:avLst/>
+            </a:prstGeom>
+          </p:spPr>
+        </p:pic>
+        <p:pic>
+          <p:nvPicPr>
+            <p:cNvPr id="11" name="Picture 10"/>
+            <p:cNvPicPr>
+              <a:picLocks noChangeAspect="1"/>
+            </p:cNvPicPr>
+            <p:nvPr/>
+          </p:nvPicPr>
+          <p:blipFill>
+            <a:blip r:embed="rId11">
+              <a:extLst>
+                <a:ext uri="{28A0092B-C50C-407E-A947-70E740481C1C}">
+                  <a14:useLocalDpi xmlns:a14="http://schemas.microsoft.com/office/drawing/2010/main" val="0"/>
+                </a:ext>
+              </a:extLst>
+            </a:blip>
+            <a:stretch>
+              <a:fillRect/>
+            </a:stretch>
+          </p:blipFill>
+          <p:spPr>
+            <a:xfrm>
+              <a:off x="6342718" y="2110133"/>
+              <a:ext cx="426236" cy="426236"/>
+            </a:xfrm>
+            <a:prstGeom prst="rect">
+              <a:avLst/>
+            </a:prstGeom>
+          </p:spPr>
+        </p:pic>
+        <p:pic>
+          <p:nvPicPr>
+            <p:cNvPr id="12" name="Picture 11"/>
+            <p:cNvPicPr>
+              <a:picLocks noChangeAspect="1"/>
+            </p:cNvPicPr>
+            <p:nvPr/>
+          </p:nvPicPr>
+          <p:blipFill>
+            <a:blip r:embed="rId12">
+              <a:extLst>
+                <a:ext uri="{28A0092B-C50C-407E-A947-70E740481C1C}">
+                  <a14:useLocalDpi xmlns:a14="http://schemas.microsoft.com/office/drawing/2010/main" val="0"/>
+                </a:ext>
+              </a:extLst>
+            </a:blip>
+            <a:stretch>
+              <a:fillRect/>
+            </a:stretch>
+          </p:blipFill>
+          <p:spPr>
+            <a:xfrm>
+              <a:off x="7647507" y="2079517"/>
+              <a:ext cx="539013" cy="337781"/>
+            </a:xfrm>
+            <a:prstGeom prst="rect">
+              <a:avLst/>
+            </a:prstGeom>
+          </p:spPr>
+        </p:pic>
+        <p:sp>
+          <p:nvSpPr>
+            <p:cNvPr id="14" name="TextBox 13"/>
+            <p:cNvSpPr txBox="1"/>
+            <p:nvPr/>
+          </p:nvSpPr>
+          <p:spPr>
+            <a:xfrm>
+              <a:off x="2408555" y="768646"/>
+              <a:ext cx="760228" cy="230832"/>
+            </a:xfrm>
+            <a:prstGeom prst="rect">
+              <a:avLst/>
+            </a:prstGeom>
+            <a:noFill/>
+          </p:spPr>
+          <p:txBody>
+            <a:bodyPr wrap="square" rtlCol="0">
+              <a:spAutoFit/>
+            </a:bodyPr>
+            <a:lstStyle/>
+            <a:p>
+              <a:r>
+                <a:rPr lang="en-US" sz="900" b="1" dirty="0" smtClean="0"/>
+                <a:t>Cloudtrail</a:t>
+              </a:r>
+              <a:endParaRPr lang="en-US" sz="900" b="1" dirty="0"/>
+            </a:p>
+          </p:txBody>
+        </p:sp>
+        <p:sp>
+          <p:nvSpPr>
+            <p:cNvPr id="15" name="TextBox 14"/>
+            <p:cNvSpPr txBox="1"/>
+            <p:nvPr/>
+          </p:nvSpPr>
+          <p:spPr>
+            <a:xfrm>
+              <a:off x="6355069" y="2487327"/>
+              <a:ext cx="521367" cy="215444"/>
+            </a:xfrm>
+            <a:prstGeom prst="rect">
+              <a:avLst/>
+            </a:prstGeom>
+            <a:noFill/>
+          </p:spPr>
+          <p:txBody>
+            <a:bodyPr wrap="square" rtlCol="0">
+              <a:spAutoFit/>
+            </a:bodyPr>
+            <a:lstStyle/>
+            <a:p>
+              <a:r>
+                <a:rPr lang="en-US" sz="800" b="1" smtClean="0"/>
+                <a:t>SNS</a:t>
+              </a:r>
+              <a:endParaRPr lang="en-US" sz="800" b="1"/>
+            </a:p>
+          </p:txBody>
+        </p:sp>
+        <p:sp>
+          <p:nvSpPr>
+            <p:cNvPr id="18" name="TextBox 17"/>
+            <p:cNvSpPr txBox="1"/>
+            <p:nvPr/>
+          </p:nvSpPr>
+          <p:spPr>
+            <a:xfrm>
+              <a:off x="4399934" y="3130918"/>
+              <a:ext cx="743565" cy="156884"/>
+            </a:xfrm>
+            <a:prstGeom prst="rect">
+              <a:avLst/>
+            </a:prstGeom>
+            <a:noFill/>
+          </p:spPr>
+          <p:txBody>
+            <a:bodyPr wrap="square" lIns="0" tIns="0" rIns="0" bIns="0" rtlCol="0" anchor="t">
+              <a:noAutofit/>
+            </a:bodyPr>
+            <a:lstStyle/>
+            <a:p>
+              <a:pPr algn="ctr"/>
+              <a:r>
+                <a:rPr lang="en-US" sz="800" b="1" dirty="0" smtClean="0"/>
+                <a:t>Event Rules</a:t>
+              </a:r>
+              <a:endParaRPr lang="en-US" sz="1400" b="1" dirty="0"/>
+            </a:p>
+          </p:txBody>
+        </p:sp>
+        <p:sp>
+          <p:nvSpPr>
+            <p:cNvPr id="21" name="TextBox 20"/>
+            <p:cNvSpPr txBox="1"/>
+            <p:nvPr/>
+          </p:nvSpPr>
+          <p:spPr>
+            <a:xfrm>
+              <a:off x="2185950" y="2364243"/>
+              <a:ext cx="1041341" cy="392400"/>
+            </a:xfrm>
+            <a:prstGeom prst="rect">
+              <a:avLst/>
+            </a:prstGeom>
+            <a:noFill/>
+          </p:spPr>
+          <p:txBody>
+            <a:bodyPr wrap="square" lIns="0" tIns="0" rIns="0" bIns="0" rtlCol="0" anchor="t">
+              <a:noAutofit/>
+            </a:bodyPr>
+            <a:lstStyle/>
+            <a:p>
+              <a:pPr algn="ctr"/>
+              <a:r>
+                <a:rPr lang="en-US" sz="900" b="1" dirty="0"/>
+                <a:t>Amazon </a:t>
+              </a:r>
+              <a:r>
+                <a:rPr lang="en-US" sz="900" b="1" dirty="0" smtClean="0"/>
+                <a:t>CloudWatch</a:t>
+              </a:r>
+              <a:endParaRPr lang="en-US" sz="900" b="1" dirty="0"/>
+            </a:p>
+          </p:txBody>
+        </p:sp>
+        <p:sp>
+          <p:nvSpPr>
+            <p:cNvPr id="22" name="TextBox 21"/>
+            <p:cNvSpPr txBox="1"/>
+            <p:nvPr/>
+          </p:nvSpPr>
+          <p:spPr>
+            <a:xfrm>
+              <a:off x="5499850" y="625659"/>
+              <a:ext cx="378084" cy="246221"/>
+            </a:xfrm>
+            <a:prstGeom prst="rect">
+              <a:avLst/>
+            </a:prstGeom>
+            <a:noFill/>
+          </p:spPr>
+          <p:txBody>
+            <a:bodyPr wrap="square" rtlCol="0">
+              <a:spAutoFit/>
+            </a:bodyPr>
+            <a:lstStyle/>
+            <a:p>
+              <a:r>
+                <a:rPr lang="en-US" sz="1000" smtClean="0"/>
+                <a:t>S3</a:t>
+              </a:r>
+              <a:endParaRPr lang="en-US" sz="1000"/>
+            </a:p>
+          </p:txBody>
+        </p:sp>
+        <p:cxnSp>
+          <p:nvCxnSpPr>
+            <p:cNvPr id="24" name="Straight Arrow Connector 23"/>
+            <p:cNvCxnSpPr/>
+            <p:nvPr/>
+          </p:nvCxnSpPr>
+          <p:spPr>
+            <a:xfrm>
+              <a:off x="3168783" y="435091"/>
+              <a:ext cx="2169563" cy="0"/>
+            </a:xfrm>
+            <a:prstGeom prst="straightConnector1">
+              <a:avLst/>
+            </a:prstGeom>
+            <a:ln>
+              <a:solidFill>
+                <a:schemeClr val="tx1"/>
+              </a:solidFill>
+              <a:tailEnd type="triangle"/>
+            </a:ln>
+          </p:spPr>
+          <p:style>
+            <a:lnRef idx="2">
+              <a:schemeClr val="accent1"/>
+            </a:lnRef>
+            <a:fillRef idx="0">
+              <a:schemeClr val="accent1"/>
+            </a:fillRef>
+            <a:effectRef idx="1">
+              <a:schemeClr val="accent1"/>
+            </a:effectRef>
+            <a:fontRef idx="minor">
+              <a:schemeClr val="tx1"/>
+            </a:fontRef>
+          </p:style>
+        </p:cxnSp>
+        <p:cxnSp>
+          <p:nvCxnSpPr>
+            <p:cNvPr id="30" name="Straight Arrow Connector 29"/>
+            <p:cNvCxnSpPr/>
+            <p:nvPr/>
+          </p:nvCxnSpPr>
+          <p:spPr>
+            <a:xfrm flipH="1">
+              <a:off x="2756647" y="1062313"/>
+              <a:ext cx="6724" cy="616748"/>
+            </a:xfrm>
+            <a:prstGeom prst="straightConnector1">
+              <a:avLst/>
+            </a:prstGeom>
+            <a:ln>
+              <a:solidFill>
+                <a:schemeClr val="tx1"/>
+              </a:solidFill>
+              <a:tailEnd type="triangle"/>
+            </a:ln>
+          </p:spPr>
+          <p:style>
+            <a:lnRef idx="2">
+              <a:schemeClr val="accent1"/>
+            </a:lnRef>
+            <a:fillRef idx="0">
+              <a:schemeClr val="accent1"/>
+            </a:fillRef>
+            <a:effectRef idx="1">
+              <a:schemeClr val="accent1"/>
+            </a:effectRef>
+            <a:fontRef idx="minor">
+              <a:schemeClr val="tx1"/>
+            </a:fontRef>
+          </p:style>
+        </p:cxnSp>
+        <p:cxnSp>
+          <p:nvCxnSpPr>
+            <p:cNvPr id="36" name="Straight Connector 35"/>
+            <p:cNvCxnSpPr/>
+            <p:nvPr/>
+          </p:nvCxnSpPr>
+          <p:spPr>
+            <a:xfrm>
+              <a:off x="3334871" y="2316447"/>
+              <a:ext cx="874058" cy="0"/>
+            </a:xfrm>
+            <a:prstGeom prst="line">
+              <a:avLst/>
+            </a:prstGeom>
+            <a:ln>
+              <a:solidFill>
+                <a:schemeClr val="tx1"/>
+              </a:solidFill>
+            </a:ln>
+          </p:spPr>
+          <p:style>
+            <a:lnRef idx="2">
+              <a:schemeClr val="accent1"/>
+            </a:lnRef>
+            <a:fillRef idx="0">
+              <a:schemeClr val="accent1"/>
+            </a:fillRef>
+            <a:effectRef idx="1">
+              <a:schemeClr val="accent1"/>
+            </a:effectRef>
+            <a:fontRef idx="minor">
+              <a:schemeClr val="tx1"/>
+            </a:fontRef>
+          </p:style>
+        </p:cxnSp>
+        <p:cxnSp>
+          <p:nvCxnSpPr>
+            <p:cNvPr id="47" name="Straight Arrow Connector 46"/>
+            <p:cNvCxnSpPr/>
+            <p:nvPr/>
+          </p:nvCxnSpPr>
+          <p:spPr>
+            <a:xfrm>
+              <a:off x="7012641" y="2294830"/>
+              <a:ext cx="558053" cy="0"/>
+            </a:xfrm>
+            <a:prstGeom prst="straightConnector1">
+              <a:avLst/>
+            </a:prstGeom>
+            <a:ln>
+              <a:solidFill>
+                <a:schemeClr val="tx1"/>
+              </a:solidFill>
+              <a:tailEnd type="triangle"/>
+            </a:ln>
+          </p:spPr>
+          <p:style>
+            <a:lnRef idx="2">
+              <a:schemeClr val="accent1"/>
+            </a:lnRef>
+            <a:fillRef idx="0">
+              <a:schemeClr val="accent1"/>
+            </a:fillRef>
+            <a:effectRef idx="1">
+              <a:schemeClr val="accent1"/>
+            </a:effectRef>
+            <a:fontRef idx="minor">
+              <a:schemeClr val="tx1"/>
+            </a:fontRef>
+          </p:style>
+        </p:cxnSp>
+        <p:sp>
+          <p:nvSpPr>
+            <p:cNvPr id="55" name="TextBox 54"/>
+            <p:cNvSpPr txBox="1"/>
+            <p:nvPr/>
+          </p:nvSpPr>
+          <p:spPr>
+            <a:xfrm>
+              <a:off x="5423068" y="3122749"/>
+              <a:ext cx="799447" cy="191245"/>
+            </a:xfrm>
+            <a:prstGeom prst="rect">
+              <a:avLst/>
+            </a:prstGeom>
+            <a:noFill/>
+          </p:spPr>
+          <p:txBody>
+            <a:bodyPr wrap="square" lIns="0" tIns="0" rIns="0" bIns="0" rtlCol="0" anchor="t">
+              <a:noAutofit/>
+            </a:bodyPr>
+            <a:lstStyle/>
+            <a:p>
+              <a:pPr algn="ctr"/>
+              <a:r>
+                <a:rPr lang="en-US" sz="800" b="1" dirty="0" smtClean="0"/>
+                <a:t>Custom Lambda functions</a:t>
+              </a:r>
+              <a:endParaRPr lang="en-US" sz="1400" b="1" dirty="0"/>
+            </a:p>
+          </p:txBody>
+        </p:sp>
+        <p:pic>
+          <p:nvPicPr>
+            <p:cNvPr id="56" name="Picture 55"/>
+            <p:cNvPicPr>
+              <a:picLocks noChangeAspect="1"/>
+            </p:cNvPicPr>
+            <p:nvPr/>
+          </p:nvPicPr>
+          <p:blipFill>
+            <a:blip r:embed="rId7">
+              <a:extLst>
+                <a:ext uri="{28A0092B-C50C-407E-A947-70E740481C1C}">
+                  <a14:useLocalDpi xmlns:a14="http://schemas.microsoft.com/office/drawing/2010/main" val="0"/>
+                </a:ext>
+              </a:extLst>
+            </a:blip>
+            <a:stretch>
+              <a:fillRect/>
+            </a:stretch>
+          </p:blipFill>
+          <p:spPr>
+            <a:xfrm>
+              <a:off x="5585001" y="2667555"/>
+              <a:ext cx="429263" cy="446097"/>
+            </a:xfrm>
+            <a:prstGeom prst="rect">
+              <a:avLst/>
+            </a:prstGeom>
+          </p:spPr>
+        </p:pic>
+        <p:cxnSp>
+          <p:nvCxnSpPr>
+            <p:cNvPr id="59" name="Straight Arrow Connector 58"/>
+            <p:cNvCxnSpPr/>
+            <p:nvPr/>
+          </p:nvCxnSpPr>
+          <p:spPr>
+            <a:xfrm flipV="1">
+              <a:off x="5047616" y="2889409"/>
+              <a:ext cx="451754" cy="1354"/>
+            </a:xfrm>
+            <a:prstGeom prst="straightConnector1">
+              <a:avLst/>
+            </a:prstGeom>
+            <a:ln>
+              <a:solidFill>
+                <a:schemeClr val="tx1"/>
+              </a:solidFill>
+              <a:tailEnd type="triangle"/>
+            </a:ln>
+          </p:spPr>
+          <p:style>
+            <a:lnRef idx="2">
+              <a:schemeClr val="accent1"/>
+            </a:lnRef>
+            <a:fillRef idx="0">
+              <a:schemeClr val="accent1"/>
+            </a:fillRef>
+            <a:effectRef idx="1">
+              <a:schemeClr val="accent1"/>
+            </a:effectRef>
+            <a:fontRef idx="minor">
+              <a:schemeClr val="tx1"/>
+            </a:fontRef>
+          </p:style>
+        </p:cxnSp>
+        <p:cxnSp>
+          <p:nvCxnSpPr>
+            <p:cNvPr id="69" name="Straight Connector 68"/>
+            <p:cNvCxnSpPr/>
+            <p:nvPr/>
+          </p:nvCxnSpPr>
+          <p:spPr>
+            <a:xfrm flipV="1">
+              <a:off x="4208929" y="1778016"/>
+              <a:ext cx="0" cy="538431"/>
+            </a:xfrm>
+            <a:prstGeom prst="line">
+              <a:avLst/>
+            </a:prstGeom>
+            <a:ln>
+              <a:solidFill>
+                <a:schemeClr val="tx1"/>
+              </a:solidFill>
+            </a:ln>
+          </p:spPr>
+          <p:style>
+            <a:lnRef idx="2">
+              <a:schemeClr val="accent1"/>
+            </a:lnRef>
+            <a:fillRef idx="0">
+              <a:schemeClr val="accent1"/>
+            </a:fillRef>
+            <a:effectRef idx="1">
+              <a:schemeClr val="accent1"/>
+            </a:effectRef>
+            <a:fontRef idx="minor">
+              <a:schemeClr val="tx1"/>
+            </a:fontRef>
+          </p:style>
+        </p:cxnSp>
+        <p:cxnSp>
+          <p:nvCxnSpPr>
+            <p:cNvPr id="71" name="Straight Connector 70"/>
+            <p:cNvCxnSpPr/>
+            <p:nvPr/>
+          </p:nvCxnSpPr>
+          <p:spPr>
+            <a:xfrm flipV="1">
+              <a:off x="4206687" y="2316447"/>
+              <a:ext cx="0" cy="564923"/>
+            </a:xfrm>
+            <a:prstGeom prst="line">
+              <a:avLst/>
+            </a:prstGeom>
+            <a:ln>
+              <a:solidFill>
+                <a:schemeClr val="tx1"/>
+              </a:solidFill>
+            </a:ln>
+          </p:spPr>
+          <p:style>
+            <a:lnRef idx="2">
+              <a:schemeClr val="accent1"/>
+            </a:lnRef>
+            <a:fillRef idx="0">
+              <a:schemeClr val="accent1"/>
+            </a:fillRef>
+            <a:effectRef idx="1">
+              <a:schemeClr val="accent1"/>
+            </a:effectRef>
+            <a:fontRef idx="minor">
+              <a:schemeClr val="tx1"/>
+            </a:fontRef>
+          </p:style>
+        </p:cxnSp>
+        <p:cxnSp>
+          <p:nvCxnSpPr>
+            <p:cNvPr id="75" name="Straight Connector 74"/>
+            <p:cNvCxnSpPr/>
+            <p:nvPr/>
+          </p:nvCxnSpPr>
+          <p:spPr>
+            <a:xfrm flipV="1">
+              <a:off x="4206687" y="2881174"/>
+              <a:ext cx="279570" cy="195"/>
+            </a:xfrm>
+            <a:prstGeom prst="line">
+              <a:avLst/>
+            </a:prstGeom>
+            <a:ln>
+              <a:solidFill>
+                <a:schemeClr val="tx1"/>
+              </a:solidFill>
+              <a:headEnd type="none" w="med" len="med"/>
+              <a:tailEnd type="triangle" w="med" len="med"/>
+            </a:ln>
+          </p:spPr>
+          <p:style>
+            <a:lnRef idx="2">
+              <a:schemeClr val="accent1"/>
+            </a:lnRef>
+            <a:fillRef idx="0">
+              <a:schemeClr val="accent1"/>
+            </a:fillRef>
+            <a:effectRef idx="1">
+              <a:schemeClr val="accent1"/>
+            </a:effectRef>
+            <a:fontRef idx="minor">
+              <a:schemeClr val="tx1"/>
+            </a:fontRef>
+          </p:style>
+        </p:cxnSp>
+        <p:cxnSp>
+          <p:nvCxnSpPr>
+            <p:cNvPr id="78" name="Straight Connector 77"/>
+            <p:cNvCxnSpPr/>
+            <p:nvPr/>
+          </p:nvCxnSpPr>
+          <p:spPr>
+            <a:xfrm>
+              <a:off x="4200381" y="1784322"/>
+              <a:ext cx="801042" cy="0"/>
+            </a:xfrm>
+            <a:prstGeom prst="line">
+              <a:avLst/>
+            </a:prstGeom>
+            <a:ln>
+              <a:solidFill>
+                <a:schemeClr val="tx1"/>
+              </a:solidFill>
+              <a:headEnd type="none" w="med" len="med"/>
+              <a:tailEnd type="triangle" w="med" len="med"/>
+            </a:ln>
+          </p:spPr>
+          <p:style>
+            <a:lnRef idx="2">
+              <a:schemeClr val="accent1"/>
+            </a:lnRef>
+            <a:fillRef idx="0">
+              <a:schemeClr val="accent1"/>
+            </a:fillRef>
+            <a:effectRef idx="1">
+              <a:schemeClr val="accent1"/>
+            </a:effectRef>
+            <a:fontRef idx="minor">
+              <a:schemeClr val="tx1"/>
+            </a:fontRef>
+          </p:style>
+        </p:cxnSp>
+        <p:cxnSp>
+          <p:nvCxnSpPr>
+            <p:cNvPr id="80" name="Straight Connector 79"/>
+            <p:cNvCxnSpPr/>
+            <p:nvPr/>
+          </p:nvCxnSpPr>
+          <p:spPr>
+            <a:xfrm>
+              <a:off x="5679418" y="1778016"/>
+              <a:ext cx="801042" cy="0"/>
+            </a:xfrm>
+            <a:prstGeom prst="line">
+              <a:avLst/>
+            </a:prstGeom>
+            <a:ln>
+              <a:solidFill>
+                <a:schemeClr val="tx1"/>
+              </a:solidFill>
+            </a:ln>
+          </p:spPr>
+          <p:style>
+            <a:lnRef idx="2">
+              <a:schemeClr val="accent1"/>
+            </a:lnRef>
+            <a:fillRef idx="0">
+              <a:schemeClr val="accent1"/>
+            </a:fillRef>
+            <a:effectRef idx="1">
+              <a:schemeClr val="accent1"/>
+            </a:effectRef>
+            <a:fontRef idx="minor">
+              <a:schemeClr val="tx1"/>
+            </a:fontRef>
+          </p:style>
+        </p:cxnSp>
+        <p:cxnSp>
+          <p:nvCxnSpPr>
+            <p:cNvPr id="82" name="Straight Arrow Connector 81"/>
+            <p:cNvCxnSpPr/>
+            <p:nvPr/>
+          </p:nvCxnSpPr>
+          <p:spPr>
+            <a:xfrm flipH="1">
+              <a:off x="6472311" y="1778016"/>
+              <a:ext cx="1010" cy="332117"/>
+            </a:xfrm>
+            <a:prstGeom prst="straightConnector1">
+              <a:avLst/>
+            </a:prstGeom>
+            <a:ln>
+              <a:solidFill>
+                <a:schemeClr val="tx1"/>
+              </a:solidFill>
+              <a:tailEnd type="triangle"/>
+            </a:ln>
+          </p:spPr>
+          <p:style>
+            <a:lnRef idx="2">
+              <a:schemeClr val="accent1"/>
+            </a:lnRef>
+            <a:fillRef idx="0">
+              <a:schemeClr val="accent1"/>
+            </a:fillRef>
+            <a:effectRef idx="1">
+              <a:schemeClr val="accent1"/>
+            </a:effectRef>
+            <a:fontRef idx="minor">
+              <a:schemeClr val="tx1"/>
+            </a:fontRef>
+          </p:style>
+        </p:cxnSp>
+        <p:cxnSp>
+          <p:nvCxnSpPr>
+            <p:cNvPr id="85" name="Straight Connector 84"/>
+            <p:cNvCxnSpPr/>
+            <p:nvPr/>
+          </p:nvCxnSpPr>
+          <p:spPr>
+            <a:xfrm>
+              <a:off x="6084794" y="2881174"/>
+              <a:ext cx="417290" cy="0"/>
+            </a:xfrm>
+            <a:prstGeom prst="line">
+              <a:avLst/>
+            </a:prstGeom>
+            <a:ln>
+              <a:solidFill>
+                <a:schemeClr val="tx1"/>
+              </a:solidFill>
+            </a:ln>
+          </p:spPr>
+          <p:style>
+            <a:lnRef idx="2">
+              <a:schemeClr val="accent1"/>
+            </a:lnRef>
+            <a:fillRef idx="0">
+              <a:schemeClr val="accent1"/>
+            </a:fillRef>
+            <a:effectRef idx="1">
+              <a:schemeClr val="accent1"/>
+            </a:effectRef>
+            <a:fontRef idx="minor">
+              <a:schemeClr val="tx1"/>
+            </a:fontRef>
+          </p:style>
+        </p:cxnSp>
+        <p:cxnSp>
+          <p:nvCxnSpPr>
+            <p:cNvPr id="88" name="Straight Arrow Connector 87"/>
+            <p:cNvCxnSpPr/>
+            <p:nvPr/>
+          </p:nvCxnSpPr>
+          <p:spPr>
+            <a:xfrm flipV="1">
+              <a:off x="6494930" y="2685163"/>
+              <a:ext cx="7154" cy="196012"/>
+            </a:xfrm>
+            <a:prstGeom prst="straightConnector1">
+              <a:avLst/>
+            </a:prstGeom>
+            <a:ln>
+              <a:solidFill>
+                <a:schemeClr val="tx1"/>
+              </a:solidFill>
+              <a:tailEnd type="triangle"/>
+            </a:ln>
+          </p:spPr>
+          <p:style>
+            <a:lnRef idx="2">
+              <a:schemeClr val="accent1"/>
+            </a:lnRef>
+            <a:fillRef idx="0">
+              <a:schemeClr val="accent1"/>
+            </a:fillRef>
+            <a:effectRef idx="1">
+              <a:schemeClr val="accent1"/>
+            </a:effectRef>
+            <a:fontRef idx="minor">
+              <a:schemeClr val="tx1"/>
+            </a:fontRef>
+          </p:style>
+        </p:cxnSp>
+        <p:sp>
+          <p:nvSpPr>
+            <p:cNvPr id="91" name="TextBox 90"/>
+            <p:cNvSpPr txBox="1"/>
+            <p:nvPr/>
+          </p:nvSpPr>
+          <p:spPr>
+            <a:xfrm>
+              <a:off x="4917687" y="2004061"/>
+              <a:ext cx="743565" cy="156884"/>
+            </a:xfrm>
+            <a:prstGeom prst="rect">
+              <a:avLst/>
+            </a:prstGeom>
+            <a:noFill/>
+          </p:spPr>
+          <p:txBody>
+            <a:bodyPr wrap="square" lIns="0" tIns="0" rIns="0" bIns="0" rtlCol="0" anchor="t">
+              <a:noAutofit/>
+            </a:bodyPr>
+            <a:lstStyle/>
+            <a:p>
+              <a:pPr algn="ctr"/>
+              <a:r>
+                <a:rPr lang="en-US" sz="800" b="1" dirty="0" smtClean="0"/>
+                <a:t>Alarms</a:t>
+              </a:r>
+              <a:endParaRPr lang="en-US" sz="1400" b="1" dirty="0"/>
+            </a:p>
+          </p:txBody>
+        </p:sp>
+        <p:sp>
+          <p:nvSpPr>
+            <p:cNvPr id="104" name="TextBox 103"/>
+            <p:cNvSpPr txBox="1"/>
+            <p:nvPr/>
+          </p:nvSpPr>
+          <p:spPr>
+            <a:xfrm>
+              <a:off x="2736473" y="1149723"/>
+              <a:ext cx="981372" cy="307777"/>
+            </a:xfrm>
+            <a:prstGeom prst="rect">
+              <a:avLst/>
+            </a:prstGeom>
+            <a:noFill/>
+          </p:spPr>
+          <p:txBody>
+            <a:bodyPr wrap="square" rtlCol="0">
+              <a:spAutoFit/>
+            </a:bodyPr>
+            <a:lstStyle/>
+            <a:p>
+              <a:r>
+                <a:rPr lang="en-US" sz="700" b="1" dirty="0" smtClean="0"/>
+                <a:t>Delivered </a:t>
+              </a:r>
+              <a:r>
+                <a:rPr lang="en-US" sz="700" b="1" dirty="0"/>
+                <a:t>to CloudWatch Logs</a:t>
+              </a:r>
+            </a:p>
+          </p:txBody>
+        </p:sp>
+      </p:grpSp>
+      <p:sp>
+        <p:nvSpPr>
+          <p:cNvPr id="19" name="TextBox 18"/>
+          <p:cNvSpPr txBox="1"/>
+          <p:nvPr/>
+        </p:nvSpPr>
+        <p:spPr>
+          <a:xfrm>
+            <a:off x="7334119" y="154563"/>
+            <a:ext cx="946132" cy="246221"/>
+          </a:xfrm>
+          <a:prstGeom prst="rect">
+            <a:avLst/>
+          </a:prstGeom>
+          <a:noFill/>
+        </p:spPr>
+        <p:txBody>
+          <a:bodyPr wrap="square" rtlCol="0">
+            <a:spAutoFit/>
+          </a:bodyPr>
+          <a:lstStyle/>
+          <a:p>
+            <a:r>
+              <a:rPr lang="en-US" sz="1000" smtClean="0"/>
+              <a:t>AWS-Region</a:t>
+            </a:r>
+            <a:endParaRPr lang="en-US" sz="1000"/>
+          </a:p>
+        </p:txBody>
+      </p:sp>
+      <p:cxnSp>
+        <p:nvCxnSpPr>
+          <p:cNvPr id="25" name="Straight Connector 24"/>
+          <p:cNvCxnSpPr>
+            <a:stCxn id="13" idx="2"/>
+          </p:cNvCxnSpPr>
+          <p:nvPr/>
+        </p:nvCxnSpPr>
+        <p:spPr>
+          <a:xfrm flipH="1">
+            <a:off x="2710919" y="4420037"/>
+            <a:ext cx="3309" cy="347455"/>
+          </a:xfrm>
+          <a:prstGeom prst="line">
+            <a:avLst/>
+          </a:prstGeom>
+          <a:ln>
+            <a:solidFill>
+              <a:schemeClr val="tx1"/>
+            </a:solidFill>
+          </a:ln>
+        </p:spPr>
+        <p:style>
+          <a:lnRef idx="2">
+            <a:schemeClr val="accent1"/>
+          </a:lnRef>
+          <a:fillRef idx="0">
+            <a:schemeClr val="accent1"/>
+          </a:fillRef>
+          <a:effectRef idx="1">
+            <a:schemeClr val="accent1"/>
+          </a:effectRef>
+          <a:fontRef idx="minor">
+            <a:schemeClr val="tx1"/>
+          </a:fontRef>
+        </p:style>
+      </p:cxnSp>
+      <p:cxnSp>
+        <p:nvCxnSpPr>
+          <p:cNvPr id="27" name="Straight Connector 26"/>
+          <p:cNvCxnSpPr/>
+          <p:nvPr/>
+        </p:nvCxnSpPr>
+        <p:spPr>
+          <a:xfrm>
+            <a:off x="2710919" y="4754880"/>
+            <a:ext cx="3677269" cy="6306"/>
+          </a:xfrm>
+          <a:prstGeom prst="line">
+            <a:avLst/>
+          </a:prstGeom>
+          <a:ln>
+            <a:solidFill>
+              <a:schemeClr val="tx1"/>
+            </a:solidFill>
+          </a:ln>
+        </p:spPr>
+        <p:style>
+          <a:lnRef idx="2">
+            <a:schemeClr val="accent1"/>
+          </a:lnRef>
+          <a:fillRef idx="0">
+            <a:schemeClr val="accent1"/>
+          </a:fillRef>
+          <a:effectRef idx="1">
+            <a:schemeClr val="accent1"/>
+          </a:effectRef>
+          <a:fontRef idx="minor">
+            <a:schemeClr val="tx1"/>
+          </a:fontRef>
+        </p:style>
+      </p:cxnSp>
+      <p:cxnSp>
+        <p:nvCxnSpPr>
+          <p:cNvPr id="29" name="Straight Arrow Connector 28"/>
+          <p:cNvCxnSpPr/>
+          <p:nvPr/>
+        </p:nvCxnSpPr>
+        <p:spPr>
+          <a:xfrm flipV="1">
+            <a:off x="6375867" y="4319282"/>
+            <a:ext cx="6015" cy="435598"/>
+          </a:xfrm>
+          <a:prstGeom prst="straightConnector1">
+            <a:avLst/>
+          </a:prstGeom>
+          <a:ln>
+            <a:solidFill>
+              <a:schemeClr val="tx1"/>
+            </a:solidFill>
             <a:tailEnd type="triangle"/>
           </a:ln>
         </p:spPr>
@@ -5688,14 +5968,14 @@
       </p:cxnSp>
       <p:sp>
         <p:nvSpPr>
-          <p:cNvPr id="104" name="TextBox 103"/>
+          <p:cNvPr id="52" name="TextBox 51"/>
           <p:cNvSpPr txBox="1"/>
           <p:nvPr/>
         </p:nvSpPr>
         <p:spPr>
           <a:xfrm>
-            <a:off x="2736473" y="1149723"/>
-            <a:ext cx="981372" cy="307777"/>
+            <a:off x="4951188" y="4416472"/>
+            <a:ext cx="871816" cy="338554"/>
           </a:xfrm>
           <a:prstGeom prst="rect">
             <a:avLst/>
@@ -5709,43 +5989,20 @@
           <a:lstStyle/>
           <a:p>
             <a:r>
-              <a:rPr lang="en-US" sz="700" b="1" dirty="0" smtClean="0"/>
-              <a:t>Delivered </a:t>
-            </a:r>
-            <a:r>
-              <a:rPr lang="en-US" sz="700" b="1" dirty="0"/>
-              <a:t>to CloudWatch Logs</a:t>
-            </a:r>
-          </a:p>
-        </p:txBody>
-      </p:sp>
-      <p:sp>
-        <p:nvSpPr>
-          <p:cNvPr id="19" name="TextBox 18"/>
-          <p:cNvSpPr txBox="1"/>
-          <p:nvPr/>
-        </p:nvSpPr>
-        <p:spPr>
-          <a:xfrm>
-            <a:off x="7334119" y="154563"/>
-            <a:ext cx="946132" cy="246221"/>
-          </a:xfrm>
-          <a:prstGeom prst="rect">
-            <a:avLst/>
-          </a:prstGeom>
-          <a:noFill/>
-        </p:spPr>
-        <p:txBody>
-          <a:bodyPr wrap="square" rtlCol="0">
-            <a:spAutoFit/>
-          </a:bodyPr>
-          <a:lstStyle/>
-          <a:p>
-            <a:r>
-              <a:rPr lang="en-US" sz="1000" smtClean="0"/>
-              <a:t>AWS-Region</a:t>
-            </a:r>
-            <a:endParaRPr lang="en-US" sz="1000"/>
+              <a:rPr lang="en-US" sz="800" b="1" dirty="0" smtClean="0"/>
+              <a:t>Managed</a:t>
+            </a:r>
+          </a:p>
+          <a:p>
+            <a:r>
+              <a:rPr lang="en-US" sz="800" b="1" dirty="0" smtClean="0"/>
+              <a:t>Config </a:t>
+            </a:r>
+            <a:r>
+              <a:rPr lang="en-US" sz="800" b="1" dirty="0" smtClean="0"/>
+              <a:t>rules</a:t>
+            </a:r>
+            <a:endParaRPr lang="en-US" sz="800" b="1" dirty="0"/>
           </a:p>
         </p:txBody>
       </p:sp>

</xml_diff>

<commit_message>
Template Description changes and included KMS in Arch Diagram
</commit_message>
<xml_diff>
--- a/assets/CIS Benchmark1.1 Architecture.pptx
+++ b/assets/CIS Benchmark1.1 Architecture.pptx
@@ -348,7 +348,7 @@
             <a:fld id="{0B25AC41-3BEC-9247-8322-91B80C013F2D}" type="datetimeFigureOut">
               <a:rPr lang="en-US" smtClean="0"/>
               <a:pPr/>
-              <a:t>9/27/17</a:t>
+              <a:t>10/12/17</a:t>
             </a:fld>
             <a:endParaRPr lang="en-US" dirty="0"/>
           </a:p>
@@ -5215,8 +5215,8 @@
           </p:nvSpPr>
           <p:spPr>
             <a:xfrm>
-              <a:off x="5499850" y="625659"/>
-              <a:ext cx="378084" cy="246221"/>
+              <a:off x="5395455" y="617732"/>
+              <a:ext cx="1237616" cy="406718"/>
             </a:xfrm>
             <a:prstGeom prst="rect">
               <a:avLst/>
@@ -5231,9 +5231,16 @@
             <a:p>
               <a:r>
                 <a:rPr lang="en-US" sz="1000" smtClean="0"/>
-                <a:t>S3</a:t>
+                <a:t>      S3 </a:t>
               </a:r>
-              <a:endParaRPr lang="en-US" sz="1000"/>
+              <a:endParaRPr lang="en-US" sz="1000" dirty="0" smtClean="0"/>
+            </a:p>
+            <a:p>
+              <a:r>
+                <a:rPr lang="en-US" sz="600" dirty="0" smtClean="0"/>
+                <a:t>(encrypted with KMS)</a:t>
+              </a:r>
+              <a:endParaRPr lang="en-US" sz="1050" dirty="0"/>
             </a:p>
           </p:txBody>
         </p:sp>
@@ -5996,16 +6003,42 @@
           <a:p>
             <a:r>
               <a:rPr lang="en-US" sz="800" b="1" dirty="0" smtClean="0"/>
-              <a:t>Config </a:t>
-            </a:r>
-            <a:r>
-              <a:rPr lang="en-US" sz="800" b="1" dirty="0" smtClean="0"/>
-              <a:t>rules</a:t>
+              <a:t>Config rules</a:t>
             </a:r>
             <a:endParaRPr lang="en-US" sz="800" b="1" dirty="0"/>
           </a:p>
         </p:txBody>
       </p:sp>
+      <p:pic>
+        <p:nvPicPr>
+          <p:cNvPr id="50" name="Picture 49"/>
+          <p:cNvPicPr>
+            <a:picLocks noChangeAspect="1"/>
+          </p:cNvPicPr>
+          <p:nvPr/>
+        </p:nvPicPr>
+        <p:blipFill>
+          <a:blip r:embed="rId13">
+            <a:extLst>
+              <a:ext uri="{28A0092B-C50C-407E-A947-70E740481C1C}">
+                <a14:useLocalDpi xmlns:a14="http://schemas.microsoft.com/office/drawing/2010/main" val="0"/>
+              </a:ext>
+            </a:extLst>
+          </a:blip>
+          <a:stretch>
+            <a:fillRect/>
+          </a:stretch>
+        </p:blipFill>
+        <p:spPr>
+          <a:xfrm>
+            <a:off x="5519675" y="356706"/>
+            <a:ext cx="248179" cy="146651"/>
+          </a:xfrm>
+          <a:prstGeom prst="rect">
+            <a:avLst/>
+          </a:prstGeom>
+        </p:spPr>
+      </p:pic>
     </p:spTree>
     <p:extLst>
       <p:ext uri="{BB962C8B-B14F-4D97-AF65-F5344CB8AC3E}">

</xml_diff>